<commit_message>
Corrected Slide three title
</commit_message>
<xml_diff>
--- a/Documentation/4999 - Sprint3.pptx
+++ b/Documentation/4999 - Sprint3.pptx
@@ -7591,7 +7591,6 @@
               <a:rPr lang="en-US" sz="1400" dirty="0"/>
               <a:t>clicks on button to assign an employee to a workstation (Trigger Action)</a:t>
             </a:r>
-            <a:endParaRPr lang="en-US" sz="1400" dirty="0"/>
           </a:p>
           <a:p>
             <a:pPr lvl="0">
@@ -7608,7 +7607,6 @@
               <a:rPr lang="en-US" sz="1400" dirty="0"/>
               <a:t>selects an empty work station</a:t>
             </a:r>
-            <a:endParaRPr lang="en-US" sz="1400" dirty="0"/>
           </a:p>
           <a:p>
             <a:pPr lvl="0">
@@ -7625,7 +7623,6 @@
               <a:rPr lang="en-US" sz="1400" dirty="0"/>
               <a:t>checks to make sure that the workstation is empty</a:t>
             </a:r>
-            <a:endParaRPr lang="en-US" sz="1400" dirty="0"/>
           </a:p>
           <a:p>
             <a:pPr lvl="0">
@@ -7642,7 +7639,6 @@
               <a:rPr lang="en-US" sz="1400" dirty="0"/>
               <a:t>adds an employee to that work station that is not already assigned to one</a:t>
             </a:r>
-            <a:endParaRPr lang="en-US" sz="1400" dirty="0"/>
           </a:p>
           <a:p>
             <a:pPr lvl="0">
@@ -7659,7 +7655,6 @@
               <a:rPr lang="en-US" sz="1400" dirty="0"/>
               <a:t>checks to make sure that employee is not assigned to a work station</a:t>
             </a:r>
-            <a:endParaRPr lang="en-US" sz="1400" dirty="0"/>
           </a:p>
           <a:p>
             <a:pPr lvl="0">
@@ -7676,7 +7671,6 @@
               <a:rPr lang="en-US" sz="1400" dirty="0"/>
               <a:t>will add that employee to the workstation</a:t>
             </a:r>
-            <a:endParaRPr lang="en-US" sz="1400" dirty="0"/>
           </a:p>
           <a:p>
             <a:pPr lvl="1">
@@ -7705,7 +7699,6 @@
               <a:rPr lang="en-US" sz="1400" dirty="0"/>
               <a:t>Internet Connection</a:t>
             </a:r>
-            <a:endParaRPr lang="en-US" sz="1400" dirty="0"/>
           </a:p>
           <a:p>
             <a:pPr lvl="1">
@@ -7722,7 +7715,6 @@
               <a:rPr lang="en-US" sz="1400" dirty="0"/>
               <a:t>Connecting to the database</a:t>
             </a:r>
-            <a:endParaRPr lang="en-US" sz="1400" dirty="0"/>
           </a:p>
           <a:p>
             <a:pPr lvl="1">
@@ -7739,7 +7731,6 @@
               <a:rPr lang="en-US" sz="1400" dirty="0"/>
               <a:t>station already assigned</a:t>
             </a:r>
-            <a:endParaRPr lang="en-US" sz="1400" dirty="0"/>
           </a:p>
           <a:p>
             <a:pPr lvl="1">
@@ -7756,7 +7747,6 @@
               <a:rPr lang="en-US" sz="1400" dirty="0"/>
               <a:t>is assigned to a different workstation</a:t>
             </a:r>
-            <a:endParaRPr lang="en-US" sz="1400" dirty="0"/>
           </a:p>
         </p:txBody>
       </p:sp>
@@ -8715,7 +8705,7 @@
           <a:p>
             <a:r>
               <a:rPr lang="en-US" dirty="0" smtClean="0"/>
-              <a:t>Entity Relationship Diagram</a:t>
+              <a:t>Database Tables</a:t>
             </a:r>
             <a:r>
               <a:rPr lang="en-US" dirty="0"/>
@@ -9460,7 +9450,6 @@
               <a:rPr lang="en-US" dirty="0"/>
               <a:t>Manager can create an employee account</a:t>
             </a:r>
-            <a:endParaRPr lang="en-US" dirty="0"/>
           </a:p>
         </p:txBody>
       </p:sp>
@@ -10594,7 +10583,6 @@
               <a:rPr lang="en-US" dirty="0"/>
               <a:t>the employee to a given work station the time they are working</a:t>
             </a:r>
-            <a:endParaRPr lang="en-US" dirty="0"/>
           </a:p>
           <a:p>
             <a:pPr lvl="1"/>
@@ -10620,7 +10608,6 @@
               <a:rPr lang="en-US" dirty="0"/>
               <a:t>employee must have an account</a:t>
             </a:r>
-            <a:endParaRPr lang="en-US" dirty="0"/>
           </a:p>
           <a:p>
             <a:pPr lvl="1"/>
@@ -10653,7 +10640,6 @@
               <a:rPr lang="en-US" dirty="0"/>
               <a:t>employee is assigned to that workstation.</a:t>
             </a:r>
-            <a:endParaRPr lang="en-US" dirty="0"/>
           </a:p>
           <a:p>
             <a:pPr lvl="6">

</xml_diff>